<commit_message>
shuffled some slides, improved some titles
</commit_message>
<xml_diff>
--- a/Slides/Module 07.3 Agile Planning and Estimation.pptx
+++ b/Slides/Module 07.3 Agile Planning and Estimation.pptx
@@ -255,7 +255,7 @@
           <a:p>
             <a:fld id="{7C7E5181-6CF5-45F7-A87A-E0E0B1FD7549}" type="datetimeFigureOut">
               <a:rPr lang="en-US" smtClean="0"/>
-              <a:t>9/21/2024</a:t>
+              <a:t>9/23/2024</a:t>
             </a:fld>
             <a:endParaRPr lang="en-US"/>
           </a:p>
@@ -3491,7 +3491,7 @@
           <a:p>
             <a:fld id="{5D2A64DE-480B-420F-9649-4F8E696E08E0}" type="datetime1">
               <a:rPr lang="en-US" smtClean="0"/>
-              <a:t>9/21/2024</a:t>
+              <a:t>9/23/2024</a:t>
             </a:fld>
             <a:endParaRPr lang="en-US"/>
           </a:p>
@@ -3815,7 +3815,7 @@
           <a:p>
             <a:fld id="{EA476A42-A091-4468-A075-64A31BE59948}" type="datetime1">
               <a:rPr lang="en-US" smtClean="0"/>
-              <a:t>9/21/2024</a:t>
+              <a:t>9/23/2024</a:t>
             </a:fld>
             <a:endParaRPr lang="en-US"/>
           </a:p>
@@ -4013,7 +4013,7 @@
           <a:p>
             <a:fld id="{0D3616D0-8311-4107-9726-6B805E7D05BA}" type="datetime1">
               <a:rPr lang="en-US" smtClean="0"/>
-              <a:t>9/21/2024</a:t>
+              <a:t>9/23/2024</a:t>
             </a:fld>
             <a:endParaRPr lang="en-US"/>
           </a:p>
@@ -4221,7 +4221,7 @@
           <a:p>
             <a:fld id="{3BC2557A-5C88-417A-A763-5AC779462A5F}" type="datetime1">
               <a:rPr lang="en-US" smtClean="0"/>
-              <a:t>9/21/2024</a:t>
+              <a:t>9/23/2024</a:t>
             </a:fld>
             <a:endParaRPr lang="en-US"/>
           </a:p>
@@ -4745,7 +4745,7 @@
           <a:p>
             <a:fld id="{07C7BFD4-467E-4EDE-93EA-052F5B39A4E5}" type="datetime1">
               <a:rPr lang="en-US" smtClean="0"/>
-              <a:t>9/21/2024</a:t>
+              <a:t>9/23/2024</a:t>
             </a:fld>
             <a:endParaRPr lang="en-US"/>
           </a:p>
@@ -4995,7 +4995,7 @@
           <a:p>
             <a:fld id="{07C7BFD4-467E-4EDE-93EA-052F5B39A4E5}" type="datetime1">
               <a:rPr lang="en-US" smtClean="0"/>
-              <a:t>9/21/2024</a:t>
+              <a:t>9/23/2024</a:t>
             </a:fld>
             <a:endParaRPr lang="en-US"/>
           </a:p>
@@ -5177,7 +5177,7 @@
           <a:p>
             <a:fld id="{109E55A0-C911-4F03-82FC-7E5926047D46}" type="datetime1">
               <a:rPr lang="en-US" smtClean="0"/>
-              <a:t>9/21/2024</a:t>
+              <a:t>9/23/2024</a:t>
             </a:fld>
             <a:endParaRPr lang="en-US"/>
           </a:p>
@@ -5490,7 +5490,7 @@
           <a:p>
             <a:fld id="{A533CBE2-D5BE-47AC-ADC2-9CDFC1D0CF90}" type="datetime1">
               <a:rPr lang="en-US" smtClean="0"/>
-              <a:t>9/21/2024</a:t>
+              <a:t>9/23/2024</a:t>
             </a:fld>
             <a:endParaRPr lang="en-US"/>
           </a:p>
@@ -5791,7 +5791,7 @@
           <a:p>
             <a:fld id="{39B7EDB1-CE74-4951-85A2-0B01C2128E28}" type="datetime1">
               <a:rPr lang="en-US" smtClean="0"/>
-              <a:t>9/21/2024</a:t>
+              <a:t>9/23/2024</a:t>
             </a:fld>
             <a:endParaRPr lang="en-US"/>
           </a:p>
@@ -6239,7 +6239,7 @@
           <a:p>
             <a:fld id="{2BC7EB92-A5C2-4807-A9DC-9EDE6CBFB241}" type="datetime1">
               <a:rPr lang="en-US" smtClean="0"/>
-              <a:t>9/21/2024</a:t>
+              <a:t>9/23/2024</a:t>
             </a:fld>
             <a:endParaRPr lang="en-US"/>
           </a:p>
@@ -6352,7 +6352,7 @@
           <a:p>
             <a:fld id="{2B7B7EE0-7771-4CD5-9B2B-3550753A54A1}" type="datetime1">
               <a:rPr lang="en-US" smtClean="0"/>
-              <a:t>9/21/2024</a:t>
+              <a:t>9/23/2024</a:t>
             </a:fld>
             <a:endParaRPr lang="en-US"/>
           </a:p>
@@ -6663,7 +6663,7 @@
           <a:p>
             <a:fld id="{F8B318B3-0E87-4416-A9B8-D891968C2727}" type="datetime1">
               <a:rPr lang="en-US" smtClean="0"/>
-              <a:t>9/21/2024</a:t>
+              <a:t>9/23/2024</a:t>
             </a:fld>
             <a:endParaRPr lang="en-US"/>
           </a:p>
@@ -6904,7 +6904,7 @@
           <a:p>
             <a:fld id="{54D997E8-DDEE-43F1-8D9B-F8A1E11DE488}" type="datetime1">
               <a:rPr lang="en-US" smtClean="0"/>
-              <a:t>9/21/2024</a:t>
+              <a:t>9/23/2024</a:t>
             </a:fld>
             <a:endParaRPr lang="en-US"/>
           </a:p>
@@ -9993,7 +9993,7 @@
           <a:p>
             <a:r>
               <a:rPr lang="en-US" dirty="0"/>
-              <a:t>Scrum: Daily progress towards product goals</a:t>
+              <a:t>The Daily Scrum meeting is the key</a:t>
             </a:r>
           </a:p>
         </p:txBody>
@@ -10975,7 +10975,7 @@
           <a:p>
             <a:r>
               <a:rPr lang="en-US" dirty="0"/>
-              <a:t>Do not pre-maturely plan or implement features</a:t>
+              <a:t>Do not prematurely plan or implement features</a:t>
             </a:r>
           </a:p>
           <a:p>
@@ -11195,7 +11195,7 @@
           <a:p>
             <a:r>
               <a:rPr lang="en-US" dirty="0"/>
-              <a:t>Tracking and Prioritizing Tasks: Product Backlog</a:t>
+              <a:t>The product backlog is a key tool in agile planning and estimation</a:t>
             </a:r>
           </a:p>
         </p:txBody>
@@ -11784,7 +11784,7 @@
           <a:p>
             <a:r>
               <a:rPr lang="en-US" dirty="0"/>
-              <a:t>Tracking and Prioritizing Tasks: Product Backlog</a:t>
+              <a:t>An agile project should re-prioritize tasks to meet changing conditions</a:t>
             </a:r>
           </a:p>
         </p:txBody>
@@ -12434,7 +12434,7 @@
           <a:p>
             <a:r>
               <a:rPr lang="en-US" dirty="0"/>
-              <a:t>Scrum: Daily progress towards product goals</a:t>
+              <a:t>Scrum is the most common approach to organizing agile projects. </a:t>
             </a:r>
           </a:p>
         </p:txBody>

</xml_diff>